<commit_message>
:wrench: Update portfolio file
</commit_message>
<xml_diff>
--- a/portfolio.pptx
+++ b/portfolio.pptx
@@ -15,13 +15,10 @@
     <p:sldId id="388" r:id="rId9"/>
     <p:sldId id="389" r:id="rId10"/>
     <p:sldId id="390" r:id="rId11"/>
-    <p:sldId id="391" r:id="rId12"/>
-    <p:sldId id="392" r:id="rId13"/>
-    <p:sldId id="393" r:id="rId14"/>
-    <p:sldId id="394" r:id="rId15"/>
-    <p:sldId id="395" r:id="rId16"/>
-    <p:sldId id="396" r:id="rId17"/>
-    <p:sldId id="397" r:id="rId18"/>
+    <p:sldId id="394" r:id="rId12"/>
+    <p:sldId id="395" r:id="rId13"/>
+    <p:sldId id="396" r:id="rId14"/>
+    <p:sldId id="397" r:id="rId15"/>
   </p:sldIdLst>
   <p:sldSz cx="12192000" cy="6858000"/>
   <p:notesSz cx="6858000" cy="9144000"/>
@@ -3312,7 +3309,7 @@
           <a:p>
             <a:r>
               <a:rPr lang="en-US" altLang="ko-KR" b="1" dirty="0"/>
-              <a:t> - 2023.09 ~ 2024.05</a:t>
+              <a:t> - 2020.09 ~ 2024.12</a:t>
             </a:r>
             <a:endParaRPr lang="ko-KR" altLang="en-US" b="1" dirty="0"/>
           </a:p>
@@ -3482,11 +3479,11 @@
           <a:p>
             <a:r>
               <a:rPr lang="en-US" altLang="ko-KR" b="1" dirty="0"/>
-              <a:t>- Dx9</a:t>
+              <a:t>- </a:t>
             </a:r>
             <a:r>
               <a:rPr lang="ko-KR" altLang="en-US" b="1" dirty="0"/>
-              <a:t> 리듬 게임</a:t>
+              <a:t>집으로</a:t>
             </a:r>
           </a:p>
         </p:txBody>
@@ -3496,7 +3493,7 @@
           <p:cNvPr id="7" name="TextBox 6">
             <a:extLst>
               <a:ext uri="{FF2B5EF4-FFF2-40B4-BE49-F238E27FC236}">
-                <a16:creationId xmlns:a16="http://schemas.microsoft.com/office/drawing/2014/main" id="{C7B4B151-1163-4C82-AE43-DF84767949A6}"/>
+                <a16:creationId xmlns:a16="http://schemas.microsoft.com/office/drawing/2014/main" id="{6A88B7C2-4CB2-479B-8005-32E344E24E8B}"/>
               </a:ext>
             </a:extLst>
           </p:cNvPr>
@@ -3535,7 +3532,7 @@
           <p:cNvPr id="8" name="TextBox 7">
             <a:extLst>
               <a:ext uri="{FF2B5EF4-FFF2-40B4-BE49-F238E27FC236}">
-                <a16:creationId xmlns:a16="http://schemas.microsoft.com/office/drawing/2014/main" id="{80553629-8E31-4CBE-BDE3-80FE142279C0}"/>
+                <a16:creationId xmlns:a16="http://schemas.microsoft.com/office/drawing/2014/main" id="{AC8F478E-A3C0-4F28-87E9-7D4D25EDB766}"/>
               </a:ext>
             </a:extLst>
           </p:cNvPr>
@@ -3574,7 +3571,7 @@
           <p:cNvPr id="9" name="TextBox 8">
             <a:extLst>
               <a:ext uri="{FF2B5EF4-FFF2-40B4-BE49-F238E27FC236}">
-                <a16:creationId xmlns:a16="http://schemas.microsoft.com/office/drawing/2014/main" id="{78FCA37C-7F20-4661-9AE7-74CB56308D55}"/>
+                <a16:creationId xmlns:a16="http://schemas.microsoft.com/office/drawing/2014/main" id="{8D840ADD-F7F5-4A6A-851E-4CA71879D682}"/>
               </a:ext>
             </a:extLst>
           </p:cNvPr>
@@ -3613,7 +3610,7 @@
           <p:cNvPr id="10" name="TextBox 9">
             <a:extLst>
               <a:ext uri="{FF2B5EF4-FFF2-40B4-BE49-F238E27FC236}">
-                <a16:creationId xmlns:a16="http://schemas.microsoft.com/office/drawing/2014/main" id="{DA781F4A-330D-42CE-A17C-C6B63481C1EA}"/>
+                <a16:creationId xmlns:a16="http://schemas.microsoft.com/office/drawing/2014/main" id="{77A678DB-5BCF-4B86-B457-22511E6C2A19}"/>
               </a:ext>
             </a:extLst>
           </p:cNvPr>
@@ -3652,7 +3649,7 @@
           <p:cNvPr id="11" name="TextBox 10">
             <a:extLst>
               <a:ext uri="{FF2B5EF4-FFF2-40B4-BE49-F238E27FC236}">
-                <a16:creationId xmlns:a16="http://schemas.microsoft.com/office/drawing/2014/main" id="{C473BEF0-9FC1-453E-B5D5-CCEE55717012}"/>
+                <a16:creationId xmlns:a16="http://schemas.microsoft.com/office/drawing/2014/main" id="{2EA028F2-9FE5-41F9-9B53-87C581F3F350}"/>
               </a:ext>
             </a:extLst>
           </p:cNvPr>
@@ -3677,7 +3674,7 @@
           <a:p>
             <a:r>
               <a:rPr lang="en-US" altLang="ko-KR" b="1" dirty="0"/>
-              <a:t> - 2023.09 ~ 2024.05</a:t>
+              <a:t> - 2019.09 ~ 2019.12</a:t>
             </a:r>
             <a:endParaRPr lang="ko-KR" altLang="en-US" b="1" dirty="0"/>
           </a:p>
@@ -3688,7 +3685,7 @@
           <p:cNvPr id="12" name="TextBox 11">
             <a:extLst>
               <a:ext uri="{FF2B5EF4-FFF2-40B4-BE49-F238E27FC236}">
-                <a16:creationId xmlns:a16="http://schemas.microsoft.com/office/drawing/2014/main" id="{D4B07F41-4657-4980-88DF-934C8AE02449}"/>
+                <a16:creationId xmlns:a16="http://schemas.microsoft.com/office/drawing/2014/main" id="{A3085E0A-A0C4-42B0-A796-B23590563963}"/>
               </a:ext>
             </a:extLst>
           </p:cNvPr>
@@ -3727,7 +3724,7 @@
           <p:cNvPr id="13" name="TextBox 12">
             <a:extLst>
               <a:ext uri="{FF2B5EF4-FFF2-40B4-BE49-F238E27FC236}">
-                <a16:creationId xmlns:a16="http://schemas.microsoft.com/office/drawing/2014/main" id="{0BD48565-EEDA-4FE3-B6E1-35FEDA4F0BBE}"/>
+                <a16:creationId xmlns:a16="http://schemas.microsoft.com/office/drawing/2014/main" id="{DDFA3E68-D3F7-4120-8876-01416FA5CF30}"/>
               </a:ext>
             </a:extLst>
           </p:cNvPr>
@@ -3763,7 +3760,7 @@
           <p:cNvPr id="14" name="TextBox 13">
             <a:extLst>
               <a:ext uri="{FF2B5EF4-FFF2-40B4-BE49-F238E27FC236}">
-                <a16:creationId xmlns:a16="http://schemas.microsoft.com/office/drawing/2014/main" id="{CB3A9686-E624-41A3-9B01-109D822F45CC}"/>
+                <a16:creationId xmlns:a16="http://schemas.microsoft.com/office/drawing/2014/main" id="{C9942501-8324-4603-9533-BB41B994B228}"/>
               </a:ext>
             </a:extLst>
           </p:cNvPr>
@@ -3797,7 +3794,7 @@
     </p:spTree>
     <p:extLst>
       <p:ext uri="{BB962C8B-B14F-4D97-AF65-F5344CB8AC3E}">
-        <p14:creationId xmlns:p14="http://schemas.microsoft.com/office/powerpoint/2010/main" val="258463394"/>
+        <p14:creationId xmlns:p14="http://schemas.microsoft.com/office/powerpoint/2010/main" val="556268083"/>
       </p:ext>
     </p:extLst>
   </p:cSld>
@@ -3847,18 +3844,21 @@
           <a:p>
             <a:r>
               <a:rPr lang="en-US" altLang="ko-KR" b="1" dirty="0"/>
-              <a:t>- Plant &amp; Zombie</a:t>
-            </a:r>
-            <a:endParaRPr lang="ko-KR" altLang="en-US" b="1" dirty="0"/>
-          </a:p>
-        </p:txBody>
-      </p:sp>
-      <p:sp>
-        <p:nvSpPr>
-          <p:cNvPr id="7" name="TextBox 6">
-            <a:extLst>
-              <a:ext uri="{FF2B5EF4-FFF2-40B4-BE49-F238E27FC236}">
-                <a16:creationId xmlns:a16="http://schemas.microsoft.com/office/drawing/2014/main" id="{240B0316-A167-4DAF-BE78-957D1D7B0E9F}"/>
+              <a:t>- </a:t>
+            </a:r>
+            <a:r>
+              <a:rPr lang="ko-KR" altLang="en-US" b="1" dirty="0"/>
+              <a:t>별의 별 분식</a:t>
+            </a:r>
+          </a:p>
+        </p:txBody>
+      </p:sp>
+      <p:sp>
+        <p:nvSpPr>
+          <p:cNvPr id="13" name="TextBox 12">
+            <a:extLst>
+              <a:ext uri="{FF2B5EF4-FFF2-40B4-BE49-F238E27FC236}">
+                <a16:creationId xmlns:a16="http://schemas.microsoft.com/office/drawing/2014/main" id="{7F4A6555-E2FC-4FB4-A732-382853A30199}"/>
               </a:ext>
             </a:extLst>
           </p:cNvPr>
@@ -3894,10 +3894,10 @@
       </p:sp>
       <p:sp>
         <p:nvSpPr>
-          <p:cNvPr id="8" name="TextBox 7">
-            <a:extLst>
-              <a:ext uri="{FF2B5EF4-FFF2-40B4-BE49-F238E27FC236}">
-                <a16:creationId xmlns:a16="http://schemas.microsoft.com/office/drawing/2014/main" id="{0E931C09-0280-443D-8869-CDAF186D4F3A}"/>
+          <p:cNvPr id="14" name="TextBox 13">
+            <a:extLst>
+              <a:ext uri="{FF2B5EF4-FFF2-40B4-BE49-F238E27FC236}">
+                <a16:creationId xmlns:a16="http://schemas.microsoft.com/office/drawing/2014/main" id="{D6FBC170-E603-487D-A23C-22125306CA84}"/>
               </a:ext>
             </a:extLst>
           </p:cNvPr>
@@ -3933,10 +3933,10 @@
       </p:sp>
       <p:sp>
         <p:nvSpPr>
-          <p:cNvPr id="9" name="TextBox 8">
-            <a:extLst>
-              <a:ext uri="{FF2B5EF4-FFF2-40B4-BE49-F238E27FC236}">
-                <a16:creationId xmlns:a16="http://schemas.microsoft.com/office/drawing/2014/main" id="{68E6FFAB-2FAC-4553-A808-2DDD59327331}"/>
+          <p:cNvPr id="15" name="TextBox 14">
+            <a:extLst>
+              <a:ext uri="{FF2B5EF4-FFF2-40B4-BE49-F238E27FC236}">
+                <a16:creationId xmlns:a16="http://schemas.microsoft.com/office/drawing/2014/main" id="{617BFFA3-6E91-472C-86BE-EE39D4789891}"/>
               </a:ext>
             </a:extLst>
           </p:cNvPr>
@@ -3972,10 +3972,10 @@
       </p:sp>
       <p:sp>
         <p:nvSpPr>
-          <p:cNvPr id="10" name="TextBox 9">
-            <a:extLst>
-              <a:ext uri="{FF2B5EF4-FFF2-40B4-BE49-F238E27FC236}">
-                <a16:creationId xmlns:a16="http://schemas.microsoft.com/office/drawing/2014/main" id="{14695634-80E2-43B2-93AC-40590E3EF780}"/>
+          <p:cNvPr id="16" name="TextBox 15">
+            <a:extLst>
+              <a:ext uri="{FF2B5EF4-FFF2-40B4-BE49-F238E27FC236}">
+                <a16:creationId xmlns:a16="http://schemas.microsoft.com/office/drawing/2014/main" id="{8E551193-D198-4C9B-B37C-0C4B2891DB21}"/>
               </a:ext>
             </a:extLst>
           </p:cNvPr>
@@ -4011,10 +4011,10 @@
       </p:sp>
       <p:sp>
         <p:nvSpPr>
-          <p:cNvPr id="11" name="TextBox 10">
-            <a:extLst>
-              <a:ext uri="{FF2B5EF4-FFF2-40B4-BE49-F238E27FC236}">
-                <a16:creationId xmlns:a16="http://schemas.microsoft.com/office/drawing/2014/main" id="{34CAA883-DB6D-445E-BE7E-96AE07633234}"/>
+          <p:cNvPr id="17" name="TextBox 16">
+            <a:extLst>
+              <a:ext uri="{FF2B5EF4-FFF2-40B4-BE49-F238E27FC236}">
+                <a16:creationId xmlns:a16="http://schemas.microsoft.com/office/drawing/2014/main" id="{45E947D1-2453-44DA-BA94-9863FA445F18}"/>
               </a:ext>
             </a:extLst>
           </p:cNvPr>
@@ -4039,7 +4039,7 @@
           <a:p>
             <a:r>
               <a:rPr lang="en-US" altLang="ko-KR" b="1" dirty="0"/>
-              <a:t> - 2023.09 ~ 2024.05</a:t>
+              <a:t> - 2019.09 ~ 2020.06</a:t>
             </a:r>
             <a:endParaRPr lang="ko-KR" altLang="en-US" b="1" dirty="0"/>
           </a:p>
@@ -4047,10 +4047,10 @@
       </p:sp>
       <p:sp>
         <p:nvSpPr>
-          <p:cNvPr id="12" name="TextBox 11">
-            <a:extLst>
-              <a:ext uri="{FF2B5EF4-FFF2-40B4-BE49-F238E27FC236}">
-                <a16:creationId xmlns:a16="http://schemas.microsoft.com/office/drawing/2014/main" id="{F6A3B13F-AD92-4DFE-A1D8-4E8FE27B3550}"/>
+          <p:cNvPr id="18" name="TextBox 17">
+            <a:extLst>
+              <a:ext uri="{FF2B5EF4-FFF2-40B4-BE49-F238E27FC236}">
+                <a16:creationId xmlns:a16="http://schemas.microsoft.com/office/drawing/2014/main" id="{53F3AF1E-A8AF-44D3-9473-B7E89FEB0964}"/>
               </a:ext>
             </a:extLst>
           </p:cNvPr>
@@ -4086,10 +4086,10 @@
       </p:sp>
       <p:sp>
         <p:nvSpPr>
-          <p:cNvPr id="13" name="TextBox 12">
-            <a:extLst>
-              <a:ext uri="{FF2B5EF4-FFF2-40B4-BE49-F238E27FC236}">
-                <a16:creationId xmlns:a16="http://schemas.microsoft.com/office/drawing/2014/main" id="{0B178DA3-A785-47AC-9F54-7920204C5780}"/>
+          <p:cNvPr id="19" name="TextBox 18">
+            <a:extLst>
+              <a:ext uri="{FF2B5EF4-FFF2-40B4-BE49-F238E27FC236}">
+                <a16:creationId xmlns:a16="http://schemas.microsoft.com/office/drawing/2014/main" id="{9EC2D00E-11F1-4BEC-B4B6-7F1A13722200}"/>
               </a:ext>
             </a:extLst>
           </p:cNvPr>
@@ -4122,10 +4122,10 @@
       </p:sp>
       <p:sp>
         <p:nvSpPr>
-          <p:cNvPr id="14" name="TextBox 13">
-            <a:extLst>
-              <a:ext uri="{FF2B5EF4-FFF2-40B4-BE49-F238E27FC236}">
-                <a16:creationId xmlns:a16="http://schemas.microsoft.com/office/drawing/2014/main" id="{9494AC45-C9D7-4DDC-8D8E-09DF326E21B6}"/>
+          <p:cNvPr id="20" name="TextBox 19">
+            <a:extLst>
+              <a:ext uri="{FF2B5EF4-FFF2-40B4-BE49-F238E27FC236}">
+                <a16:creationId xmlns:a16="http://schemas.microsoft.com/office/drawing/2014/main" id="{EE47C559-C9D0-4176-B40C-15AA0A8363E5}"/>
               </a:ext>
             </a:extLst>
           </p:cNvPr>
@@ -4159,7 +4159,7 @@
     </p:spTree>
     <p:extLst>
       <p:ext uri="{BB962C8B-B14F-4D97-AF65-F5344CB8AC3E}">
-        <p14:creationId xmlns:p14="http://schemas.microsoft.com/office/powerpoint/2010/main" val="407126964"/>
+        <p14:creationId xmlns:p14="http://schemas.microsoft.com/office/powerpoint/2010/main" val="1291740744"/>
       </p:ext>
     </p:extLst>
   </p:cSld>
@@ -4209,1098 +4209,6 @@
           <a:p>
             <a:r>
               <a:rPr lang="en-US" altLang="ko-KR" b="1" dirty="0"/>
-              <a:t>- Tetris</a:t>
-            </a:r>
-            <a:endParaRPr lang="ko-KR" altLang="en-US" b="1" dirty="0"/>
-          </a:p>
-        </p:txBody>
-      </p:sp>
-      <p:sp>
-        <p:nvSpPr>
-          <p:cNvPr id="7" name="TextBox 6">
-            <a:extLst>
-              <a:ext uri="{FF2B5EF4-FFF2-40B4-BE49-F238E27FC236}">
-                <a16:creationId xmlns:a16="http://schemas.microsoft.com/office/drawing/2014/main" id="{5F205B59-FCFA-48B4-A023-8B477AFCBC12}"/>
-              </a:ext>
-            </a:extLst>
-          </p:cNvPr>
-          <p:cNvSpPr txBox="1"/>
-          <p:nvPr/>
-        </p:nvSpPr>
-        <p:spPr>
-          <a:xfrm>
-            <a:off x="6454420" y="820688"/>
-            <a:ext cx="4608576" cy="430887"/>
-          </a:xfrm>
-          <a:prstGeom prst="rect">
-            <a:avLst/>
-          </a:prstGeom>
-          <a:noFill/>
-        </p:spPr>
-        <p:txBody>
-          <a:bodyPr wrap="square" rtlCol="0">
-            <a:spAutoFit/>
-          </a:bodyPr>
-          <a:lstStyle/>
-          <a:p>
-            <a:r>
-              <a:rPr lang="en-US" altLang="ko-KR" sz="2200" b="1" dirty="0"/>
-              <a:t># </a:t>
-            </a:r>
-            <a:r>
-              <a:rPr lang="ko-KR" altLang="en-US" sz="2200" b="1" dirty="0"/>
-              <a:t>개발 기간</a:t>
-            </a:r>
-          </a:p>
-        </p:txBody>
-      </p:sp>
-      <p:sp>
-        <p:nvSpPr>
-          <p:cNvPr id="8" name="TextBox 7">
-            <a:extLst>
-              <a:ext uri="{FF2B5EF4-FFF2-40B4-BE49-F238E27FC236}">
-                <a16:creationId xmlns:a16="http://schemas.microsoft.com/office/drawing/2014/main" id="{4055AC8F-2B15-4543-80F2-CCC79C7D2075}"/>
-              </a:ext>
-            </a:extLst>
-          </p:cNvPr>
-          <p:cNvSpPr txBox="1"/>
-          <p:nvPr/>
-        </p:nvSpPr>
-        <p:spPr>
-          <a:xfrm>
-            <a:off x="838200" y="4768237"/>
-            <a:ext cx="4608576" cy="430887"/>
-          </a:xfrm>
-          <a:prstGeom prst="rect">
-            <a:avLst/>
-          </a:prstGeom>
-          <a:noFill/>
-        </p:spPr>
-        <p:txBody>
-          <a:bodyPr wrap="square" rtlCol="0">
-            <a:spAutoFit/>
-          </a:bodyPr>
-          <a:lstStyle/>
-          <a:p>
-            <a:r>
-              <a:rPr lang="en-US" altLang="ko-KR" sz="2200" b="1" dirty="0"/>
-              <a:t># </a:t>
-            </a:r>
-            <a:r>
-              <a:rPr lang="ko-KR" altLang="en-US" sz="2200" b="1" dirty="0"/>
-              <a:t>게임 개요</a:t>
-            </a:r>
-          </a:p>
-        </p:txBody>
-      </p:sp>
-      <p:sp>
-        <p:nvSpPr>
-          <p:cNvPr id="9" name="TextBox 8">
-            <a:extLst>
-              <a:ext uri="{FF2B5EF4-FFF2-40B4-BE49-F238E27FC236}">
-                <a16:creationId xmlns:a16="http://schemas.microsoft.com/office/drawing/2014/main" id="{D840B657-E7F8-4565-8F07-88B0A4A66ED7}"/>
-              </a:ext>
-            </a:extLst>
-          </p:cNvPr>
-          <p:cNvSpPr txBox="1"/>
-          <p:nvPr/>
-        </p:nvSpPr>
-        <p:spPr>
-          <a:xfrm>
-            <a:off x="6454420" y="2240790"/>
-            <a:ext cx="4608576" cy="430887"/>
-          </a:xfrm>
-          <a:prstGeom prst="rect">
-            <a:avLst/>
-          </a:prstGeom>
-          <a:noFill/>
-        </p:spPr>
-        <p:txBody>
-          <a:bodyPr wrap="square" rtlCol="0">
-            <a:spAutoFit/>
-          </a:bodyPr>
-          <a:lstStyle/>
-          <a:p>
-            <a:r>
-              <a:rPr lang="en-US" altLang="ko-KR" sz="2200" b="1" dirty="0"/>
-              <a:t># </a:t>
-            </a:r>
-            <a:r>
-              <a:rPr lang="ko-KR" altLang="en-US" sz="2200" b="1" dirty="0"/>
-              <a:t>팀원</a:t>
-            </a:r>
-          </a:p>
-        </p:txBody>
-      </p:sp>
-      <p:sp>
-        <p:nvSpPr>
-          <p:cNvPr id="10" name="TextBox 9">
-            <a:extLst>
-              <a:ext uri="{FF2B5EF4-FFF2-40B4-BE49-F238E27FC236}">
-                <a16:creationId xmlns:a16="http://schemas.microsoft.com/office/drawing/2014/main" id="{0A850A3D-D71F-499C-988B-8501431C560C}"/>
-              </a:ext>
-            </a:extLst>
-          </p:cNvPr>
-          <p:cNvSpPr txBox="1"/>
-          <p:nvPr/>
-        </p:nvSpPr>
-        <p:spPr>
-          <a:xfrm>
-            <a:off x="6454420" y="3652668"/>
-            <a:ext cx="4608576" cy="430887"/>
-          </a:xfrm>
-          <a:prstGeom prst="rect">
-            <a:avLst/>
-          </a:prstGeom>
-          <a:noFill/>
-        </p:spPr>
-        <p:txBody>
-          <a:bodyPr wrap="square" rtlCol="0">
-            <a:spAutoFit/>
-          </a:bodyPr>
-          <a:lstStyle/>
-          <a:p>
-            <a:r>
-              <a:rPr lang="en-US" altLang="ko-KR" sz="2200" b="1" dirty="0"/>
-              <a:t># </a:t>
-            </a:r>
-            <a:r>
-              <a:rPr lang="ko-KR" altLang="en-US" sz="2200" b="1" dirty="0"/>
-              <a:t>작업 내용</a:t>
-            </a:r>
-          </a:p>
-        </p:txBody>
-      </p:sp>
-      <p:sp>
-        <p:nvSpPr>
-          <p:cNvPr id="11" name="TextBox 10">
-            <a:extLst>
-              <a:ext uri="{FF2B5EF4-FFF2-40B4-BE49-F238E27FC236}">
-                <a16:creationId xmlns:a16="http://schemas.microsoft.com/office/drawing/2014/main" id="{C47C221D-5845-456D-9B6D-36BD2257A9D5}"/>
-              </a:ext>
-            </a:extLst>
-          </p:cNvPr>
-          <p:cNvSpPr txBox="1"/>
-          <p:nvPr/>
-        </p:nvSpPr>
-        <p:spPr>
-          <a:xfrm>
-            <a:off x="6454420" y="1249245"/>
-            <a:ext cx="4608576" cy="369332"/>
-          </a:xfrm>
-          <a:prstGeom prst="rect">
-            <a:avLst/>
-          </a:prstGeom>
-          <a:noFill/>
-        </p:spPr>
-        <p:txBody>
-          <a:bodyPr wrap="square" rtlCol="0">
-            <a:spAutoFit/>
-          </a:bodyPr>
-          <a:lstStyle/>
-          <a:p>
-            <a:r>
-              <a:rPr lang="en-US" altLang="ko-KR" b="1" dirty="0"/>
-              <a:t> - 2023.09 ~ 2024.05</a:t>
-            </a:r>
-            <a:endParaRPr lang="ko-KR" altLang="en-US" b="1" dirty="0"/>
-          </a:p>
-        </p:txBody>
-      </p:sp>
-      <p:sp>
-        <p:nvSpPr>
-          <p:cNvPr id="12" name="TextBox 11">
-            <a:extLst>
-              <a:ext uri="{FF2B5EF4-FFF2-40B4-BE49-F238E27FC236}">
-                <a16:creationId xmlns:a16="http://schemas.microsoft.com/office/drawing/2014/main" id="{07E71434-2C48-4D0C-9246-915F436CD1CD}"/>
-              </a:ext>
-            </a:extLst>
-          </p:cNvPr>
-          <p:cNvSpPr txBox="1"/>
-          <p:nvPr/>
-        </p:nvSpPr>
-        <p:spPr>
-          <a:xfrm>
-            <a:off x="6454420" y="2671677"/>
-            <a:ext cx="4608576" cy="369332"/>
-          </a:xfrm>
-          <a:prstGeom prst="rect">
-            <a:avLst/>
-          </a:prstGeom>
-          <a:noFill/>
-        </p:spPr>
-        <p:txBody>
-          <a:bodyPr wrap="square" rtlCol="0">
-            <a:spAutoFit/>
-          </a:bodyPr>
-          <a:lstStyle/>
-          <a:p>
-            <a:r>
-              <a:rPr lang="en-US" altLang="ko-KR" b="1" dirty="0"/>
-              <a:t> - </a:t>
-            </a:r>
-            <a:r>
-              <a:rPr lang="ko-KR" altLang="en-US" b="1" dirty="0"/>
-              <a:t>개인</a:t>
-            </a:r>
-          </a:p>
-        </p:txBody>
-      </p:sp>
-      <p:sp>
-        <p:nvSpPr>
-          <p:cNvPr id="13" name="TextBox 12">
-            <a:extLst>
-              <a:ext uri="{FF2B5EF4-FFF2-40B4-BE49-F238E27FC236}">
-                <a16:creationId xmlns:a16="http://schemas.microsoft.com/office/drawing/2014/main" id="{F8B8C80A-9FB4-4516-B3DE-07FD13D5F05A}"/>
-              </a:ext>
-            </a:extLst>
-          </p:cNvPr>
-          <p:cNvSpPr txBox="1"/>
-          <p:nvPr/>
-        </p:nvSpPr>
-        <p:spPr>
-          <a:xfrm>
-            <a:off x="6454420" y="4083555"/>
-            <a:ext cx="4608576" cy="369332"/>
-          </a:xfrm>
-          <a:prstGeom prst="rect">
-            <a:avLst/>
-          </a:prstGeom>
-          <a:noFill/>
-        </p:spPr>
-        <p:txBody>
-          <a:bodyPr wrap="square" rtlCol="0">
-            <a:spAutoFit/>
-          </a:bodyPr>
-          <a:lstStyle/>
-          <a:p>
-            <a:r>
-              <a:rPr lang="en-US" altLang="ko-KR" b="1" dirty="0"/>
-              <a:t> - </a:t>
-            </a:r>
-            <a:endParaRPr lang="ko-KR" altLang="en-US" b="1" dirty="0"/>
-          </a:p>
-        </p:txBody>
-      </p:sp>
-      <p:sp>
-        <p:nvSpPr>
-          <p:cNvPr id="14" name="TextBox 13">
-            <a:extLst>
-              <a:ext uri="{FF2B5EF4-FFF2-40B4-BE49-F238E27FC236}">
-                <a16:creationId xmlns:a16="http://schemas.microsoft.com/office/drawing/2014/main" id="{598291E3-498D-4A5F-BBD3-54A563BBCE6E}"/>
-              </a:ext>
-            </a:extLst>
-          </p:cNvPr>
-          <p:cNvSpPr txBox="1"/>
-          <p:nvPr/>
-        </p:nvSpPr>
-        <p:spPr>
-          <a:xfrm>
-            <a:off x="838200" y="5199124"/>
-            <a:ext cx="4608576" cy="369332"/>
-          </a:xfrm>
-          <a:prstGeom prst="rect">
-            <a:avLst/>
-          </a:prstGeom>
-          <a:noFill/>
-        </p:spPr>
-        <p:txBody>
-          <a:bodyPr wrap="square" rtlCol="0">
-            <a:spAutoFit/>
-          </a:bodyPr>
-          <a:lstStyle/>
-          <a:p>
-            <a:r>
-              <a:rPr lang="en-US" altLang="ko-KR" b="1" dirty="0"/>
-              <a:t> - </a:t>
-            </a:r>
-            <a:endParaRPr lang="ko-KR" altLang="en-US" b="1" dirty="0"/>
-          </a:p>
-        </p:txBody>
-      </p:sp>
-    </p:spTree>
-    <p:extLst>
-      <p:ext uri="{BB962C8B-B14F-4D97-AF65-F5344CB8AC3E}">
-        <p14:creationId xmlns:p14="http://schemas.microsoft.com/office/powerpoint/2010/main" val="4274066494"/>
-      </p:ext>
-    </p:extLst>
-  </p:cSld>
-  <p:clrMapOvr>
-    <a:masterClrMapping/>
-  </p:clrMapOvr>
-</p:sld>
-</file>
-
-<file path=ppt/slides/slide14.xml><?xml version="1.0" encoding="utf-8"?>
-<p:sld xmlns:a="http://schemas.openxmlformats.org/drawingml/2006/main" xmlns:r="http://schemas.openxmlformats.org/officeDocument/2006/relationships" xmlns:p="http://schemas.openxmlformats.org/presentationml/2006/main">
-  <p:cSld>
-    <p:spTree>
-      <p:nvGrpSpPr>
-        <p:cNvPr id="1" name=""/>
-        <p:cNvGrpSpPr/>
-        <p:nvPr/>
-      </p:nvGrpSpPr>
-      <p:grpSpPr>
-        <a:xfrm>
-          <a:off x="0" y="0"/>
-          <a:ext cx="0" cy="0"/>
-          <a:chOff x="0" y="0"/>
-          <a:chExt cx="0" cy="0"/>
-        </a:xfrm>
-      </p:grpSpPr>
-      <p:sp>
-        <p:nvSpPr>
-          <p:cNvPr id="2" name="제목 1">
-            <a:extLst>
-              <a:ext uri="{FF2B5EF4-FFF2-40B4-BE49-F238E27FC236}">
-                <a16:creationId xmlns:a16="http://schemas.microsoft.com/office/drawing/2014/main" id="{6FF7DBDA-DB81-406A-A742-93DF6F6D8BFF}"/>
-              </a:ext>
-            </a:extLst>
-          </p:cNvPr>
-          <p:cNvSpPr>
-            <a:spLocks noGrp="1"/>
-          </p:cNvSpPr>
-          <p:nvPr>
-            <p:ph type="title"/>
-          </p:nvPr>
-        </p:nvSpPr>
-        <p:spPr/>
-        <p:txBody>
-          <a:bodyPr/>
-          <a:lstStyle/>
-          <a:p>
-            <a:r>
-              <a:rPr lang="en-US" altLang="ko-KR" b="1" dirty="0"/>
-              <a:t>- </a:t>
-            </a:r>
-            <a:r>
-              <a:rPr lang="ko-KR" altLang="en-US" b="1" dirty="0"/>
-              <a:t>집으로</a:t>
-            </a:r>
-          </a:p>
-        </p:txBody>
-      </p:sp>
-      <p:sp>
-        <p:nvSpPr>
-          <p:cNvPr id="7" name="TextBox 6">
-            <a:extLst>
-              <a:ext uri="{FF2B5EF4-FFF2-40B4-BE49-F238E27FC236}">
-                <a16:creationId xmlns:a16="http://schemas.microsoft.com/office/drawing/2014/main" id="{6A88B7C2-4CB2-479B-8005-32E344E24E8B}"/>
-              </a:ext>
-            </a:extLst>
-          </p:cNvPr>
-          <p:cNvSpPr txBox="1"/>
-          <p:nvPr/>
-        </p:nvSpPr>
-        <p:spPr>
-          <a:xfrm>
-            <a:off x="6454420" y="820688"/>
-            <a:ext cx="4608576" cy="430887"/>
-          </a:xfrm>
-          <a:prstGeom prst="rect">
-            <a:avLst/>
-          </a:prstGeom>
-          <a:noFill/>
-        </p:spPr>
-        <p:txBody>
-          <a:bodyPr wrap="square" rtlCol="0">
-            <a:spAutoFit/>
-          </a:bodyPr>
-          <a:lstStyle/>
-          <a:p>
-            <a:r>
-              <a:rPr lang="en-US" altLang="ko-KR" sz="2200" b="1" dirty="0"/>
-              <a:t># </a:t>
-            </a:r>
-            <a:r>
-              <a:rPr lang="ko-KR" altLang="en-US" sz="2200" b="1" dirty="0"/>
-              <a:t>개발 기간</a:t>
-            </a:r>
-          </a:p>
-        </p:txBody>
-      </p:sp>
-      <p:sp>
-        <p:nvSpPr>
-          <p:cNvPr id="8" name="TextBox 7">
-            <a:extLst>
-              <a:ext uri="{FF2B5EF4-FFF2-40B4-BE49-F238E27FC236}">
-                <a16:creationId xmlns:a16="http://schemas.microsoft.com/office/drawing/2014/main" id="{AC8F478E-A3C0-4F28-87E9-7D4D25EDB766}"/>
-              </a:ext>
-            </a:extLst>
-          </p:cNvPr>
-          <p:cNvSpPr txBox="1"/>
-          <p:nvPr/>
-        </p:nvSpPr>
-        <p:spPr>
-          <a:xfrm>
-            <a:off x="838200" y="4768237"/>
-            <a:ext cx="4608576" cy="430887"/>
-          </a:xfrm>
-          <a:prstGeom prst="rect">
-            <a:avLst/>
-          </a:prstGeom>
-          <a:noFill/>
-        </p:spPr>
-        <p:txBody>
-          <a:bodyPr wrap="square" rtlCol="0">
-            <a:spAutoFit/>
-          </a:bodyPr>
-          <a:lstStyle/>
-          <a:p>
-            <a:r>
-              <a:rPr lang="en-US" altLang="ko-KR" sz="2200" b="1" dirty="0"/>
-              <a:t># </a:t>
-            </a:r>
-            <a:r>
-              <a:rPr lang="ko-KR" altLang="en-US" sz="2200" b="1" dirty="0"/>
-              <a:t>게임 개요</a:t>
-            </a:r>
-          </a:p>
-        </p:txBody>
-      </p:sp>
-      <p:sp>
-        <p:nvSpPr>
-          <p:cNvPr id="9" name="TextBox 8">
-            <a:extLst>
-              <a:ext uri="{FF2B5EF4-FFF2-40B4-BE49-F238E27FC236}">
-                <a16:creationId xmlns:a16="http://schemas.microsoft.com/office/drawing/2014/main" id="{8D840ADD-F7F5-4A6A-851E-4CA71879D682}"/>
-              </a:ext>
-            </a:extLst>
-          </p:cNvPr>
-          <p:cNvSpPr txBox="1"/>
-          <p:nvPr/>
-        </p:nvSpPr>
-        <p:spPr>
-          <a:xfrm>
-            <a:off x="6454420" y="2240790"/>
-            <a:ext cx="4608576" cy="430887"/>
-          </a:xfrm>
-          <a:prstGeom prst="rect">
-            <a:avLst/>
-          </a:prstGeom>
-          <a:noFill/>
-        </p:spPr>
-        <p:txBody>
-          <a:bodyPr wrap="square" rtlCol="0">
-            <a:spAutoFit/>
-          </a:bodyPr>
-          <a:lstStyle/>
-          <a:p>
-            <a:r>
-              <a:rPr lang="en-US" altLang="ko-KR" sz="2200" b="1" dirty="0"/>
-              <a:t># </a:t>
-            </a:r>
-            <a:r>
-              <a:rPr lang="ko-KR" altLang="en-US" sz="2200" b="1" dirty="0"/>
-              <a:t>팀원</a:t>
-            </a:r>
-          </a:p>
-        </p:txBody>
-      </p:sp>
-      <p:sp>
-        <p:nvSpPr>
-          <p:cNvPr id="10" name="TextBox 9">
-            <a:extLst>
-              <a:ext uri="{FF2B5EF4-FFF2-40B4-BE49-F238E27FC236}">
-                <a16:creationId xmlns:a16="http://schemas.microsoft.com/office/drawing/2014/main" id="{77A678DB-5BCF-4B86-B457-22511E6C2A19}"/>
-              </a:ext>
-            </a:extLst>
-          </p:cNvPr>
-          <p:cNvSpPr txBox="1"/>
-          <p:nvPr/>
-        </p:nvSpPr>
-        <p:spPr>
-          <a:xfrm>
-            <a:off x="6454420" y="3652668"/>
-            <a:ext cx="4608576" cy="430887"/>
-          </a:xfrm>
-          <a:prstGeom prst="rect">
-            <a:avLst/>
-          </a:prstGeom>
-          <a:noFill/>
-        </p:spPr>
-        <p:txBody>
-          <a:bodyPr wrap="square" rtlCol="0">
-            <a:spAutoFit/>
-          </a:bodyPr>
-          <a:lstStyle/>
-          <a:p>
-            <a:r>
-              <a:rPr lang="en-US" altLang="ko-KR" sz="2200" b="1" dirty="0"/>
-              <a:t># </a:t>
-            </a:r>
-            <a:r>
-              <a:rPr lang="ko-KR" altLang="en-US" sz="2200" b="1" dirty="0"/>
-              <a:t>작업 내용</a:t>
-            </a:r>
-          </a:p>
-        </p:txBody>
-      </p:sp>
-      <p:sp>
-        <p:nvSpPr>
-          <p:cNvPr id="11" name="TextBox 10">
-            <a:extLst>
-              <a:ext uri="{FF2B5EF4-FFF2-40B4-BE49-F238E27FC236}">
-                <a16:creationId xmlns:a16="http://schemas.microsoft.com/office/drawing/2014/main" id="{2EA028F2-9FE5-41F9-9B53-87C581F3F350}"/>
-              </a:ext>
-            </a:extLst>
-          </p:cNvPr>
-          <p:cNvSpPr txBox="1"/>
-          <p:nvPr/>
-        </p:nvSpPr>
-        <p:spPr>
-          <a:xfrm>
-            <a:off x="6454420" y="1249245"/>
-            <a:ext cx="4608576" cy="369332"/>
-          </a:xfrm>
-          <a:prstGeom prst="rect">
-            <a:avLst/>
-          </a:prstGeom>
-          <a:noFill/>
-        </p:spPr>
-        <p:txBody>
-          <a:bodyPr wrap="square" rtlCol="0">
-            <a:spAutoFit/>
-          </a:bodyPr>
-          <a:lstStyle/>
-          <a:p>
-            <a:r>
-              <a:rPr lang="en-US" altLang="ko-KR" b="1" dirty="0"/>
-              <a:t> - 2023.09 ~ 2024.05</a:t>
-            </a:r>
-            <a:endParaRPr lang="ko-KR" altLang="en-US" b="1" dirty="0"/>
-          </a:p>
-        </p:txBody>
-      </p:sp>
-      <p:sp>
-        <p:nvSpPr>
-          <p:cNvPr id="12" name="TextBox 11">
-            <a:extLst>
-              <a:ext uri="{FF2B5EF4-FFF2-40B4-BE49-F238E27FC236}">
-                <a16:creationId xmlns:a16="http://schemas.microsoft.com/office/drawing/2014/main" id="{A3085E0A-A0C4-42B0-A796-B23590563963}"/>
-              </a:ext>
-            </a:extLst>
-          </p:cNvPr>
-          <p:cNvSpPr txBox="1"/>
-          <p:nvPr/>
-        </p:nvSpPr>
-        <p:spPr>
-          <a:xfrm>
-            <a:off x="6454420" y="2671677"/>
-            <a:ext cx="4608576" cy="369332"/>
-          </a:xfrm>
-          <a:prstGeom prst="rect">
-            <a:avLst/>
-          </a:prstGeom>
-          <a:noFill/>
-        </p:spPr>
-        <p:txBody>
-          <a:bodyPr wrap="square" rtlCol="0">
-            <a:spAutoFit/>
-          </a:bodyPr>
-          <a:lstStyle/>
-          <a:p>
-            <a:r>
-              <a:rPr lang="en-US" altLang="ko-KR" b="1" dirty="0"/>
-              <a:t> - </a:t>
-            </a:r>
-            <a:r>
-              <a:rPr lang="ko-KR" altLang="en-US" b="1" dirty="0"/>
-              <a:t>개인</a:t>
-            </a:r>
-          </a:p>
-        </p:txBody>
-      </p:sp>
-      <p:sp>
-        <p:nvSpPr>
-          <p:cNvPr id="13" name="TextBox 12">
-            <a:extLst>
-              <a:ext uri="{FF2B5EF4-FFF2-40B4-BE49-F238E27FC236}">
-                <a16:creationId xmlns:a16="http://schemas.microsoft.com/office/drawing/2014/main" id="{DDFA3E68-D3F7-4120-8876-01416FA5CF30}"/>
-              </a:ext>
-            </a:extLst>
-          </p:cNvPr>
-          <p:cNvSpPr txBox="1"/>
-          <p:nvPr/>
-        </p:nvSpPr>
-        <p:spPr>
-          <a:xfrm>
-            <a:off x="6454420" y="4083555"/>
-            <a:ext cx="4608576" cy="369332"/>
-          </a:xfrm>
-          <a:prstGeom prst="rect">
-            <a:avLst/>
-          </a:prstGeom>
-          <a:noFill/>
-        </p:spPr>
-        <p:txBody>
-          <a:bodyPr wrap="square" rtlCol="0">
-            <a:spAutoFit/>
-          </a:bodyPr>
-          <a:lstStyle/>
-          <a:p>
-            <a:r>
-              <a:rPr lang="en-US" altLang="ko-KR" b="1" dirty="0"/>
-              <a:t> - </a:t>
-            </a:r>
-            <a:endParaRPr lang="ko-KR" altLang="en-US" b="1" dirty="0"/>
-          </a:p>
-        </p:txBody>
-      </p:sp>
-      <p:sp>
-        <p:nvSpPr>
-          <p:cNvPr id="14" name="TextBox 13">
-            <a:extLst>
-              <a:ext uri="{FF2B5EF4-FFF2-40B4-BE49-F238E27FC236}">
-                <a16:creationId xmlns:a16="http://schemas.microsoft.com/office/drawing/2014/main" id="{C9942501-8324-4603-9533-BB41B994B228}"/>
-              </a:ext>
-            </a:extLst>
-          </p:cNvPr>
-          <p:cNvSpPr txBox="1"/>
-          <p:nvPr/>
-        </p:nvSpPr>
-        <p:spPr>
-          <a:xfrm>
-            <a:off x="838200" y="5199124"/>
-            <a:ext cx="4608576" cy="369332"/>
-          </a:xfrm>
-          <a:prstGeom prst="rect">
-            <a:avLst/>
-          </a:prstGeom>
-          <a:noFill/>
-        </p:spPr>
-        <p:txBody>
-          <a:bodyPr wrap="square" rtlCol="0">
-            <a:spAutoFit/>
-          </a:bodyPr>
-          <a:lstStyle/>
-          <a:p>
-            <a:r>
-              <a:rPr lang="en-US" altLang="ko-KR" b="1" dirty="0"/>
-              <a:t> - </a:t>
-            </a:r>
-            <a:endParaRPr lang="ko-KR" altLang="en-US" b="1" dirty="0"/>
-          </a:p>
-        </p:txBody>
-      </p:sp>
-    </p:spTree>
-    <p:extLst>
-      <p:ext uri="{BB962C8B-B14F-4D97-AF65-F5344CB8AC3E}">
-        <p14:creationId xmlns:p14="http://schemas.microsoft.com/office/powerpoint/2010/main" val="556268083"/>
-      </p:ext>
-    </p:extLst>
-  </p:cSld>
-  <p:clrMapOvr>
-    <a:masterClrMapping/>
-  </p:clrMapOvr>
-</p:sld>
-</file>
-
-<file path=ppt/slides/slide15.xml><?xml version="1.0" encoding="utf-8"?>
-<p:sld xmlns:a="http://schemas.openxmlformats.org/drawingml/2006/main" xmlns:r="http://schemas.openxmlformats.org/officeDocument/2006/relationships" xmlns:p="http://schemas.openxmlformats.org/presentationml/2006/main">
-  <p:cSld>
-    <p:spTree>
-      <p:nvGrpSpPr>
-        <p:cNvPr id="1" name=""/>
-        <p:cNvGrpSpPr/>
-        <p:nvPr/>
-      </p:nvGrpSpPr>
-      <p:grpSpPr>
-        <a:xfrm>
-          <a:off x="0" y="0"/>
-          <a:ext cx="0" cy="0"/>
-          <a:chOff x="0" y="0"/>
-          <a:chExt cx="0" cy="0"/>
-        </a:xfrm>
-      </p:grpSpPr>
-      <p:sp>
-        <p:nvSpPr>
-          <p:cNvPr id="2" name="제목 1">
-            <a:extLst>
-              <a:ext uri="{FF2B5EF4-FFF2-40B4-BE49-F238E27FC236}">
-                <a16:creationId xmlns:a16="http://schemas.microsoft.com/office/drawing/2014/main" id="{6FF7DBDA-DB81-406A-A742-93DF6F6D8BFF}"/>
-              </a:ext>
-            </a:extLst>
-          </p:cNvPr>
-          <p:cNvSpPr>
-            <a:spLocks noGrp="1"/>
-          </p:cNvSpPr>
-          <p:nvPr>
-            <p:ph type="title"/>
-          </p:nvPr>
-        </p:nvSpPr>
-        <p:spPr/>
-        <p:txBody>
-          <a:bodyPr/>
-          <a:lstStyle/>
-          <a:p>
-            <a:r>
-              <a:rPr lang="en-US" altLang="ko-KR" b="1" dirty="0"/>
-              <a:t>- </a:t>
-            </a:r>
-            <a:r>
-              <a:rPr lang="ko-KR" altLang="en-US" b="1" dirty="0"/>
-              <a:t>별의 별 분식</a:t>
-            </a:r>
-          </a:p>
-        </p:txBody>
-      </p:sp>
-      <p:sp>
-        <p:nvSpPr>
-          <p:cNvPr id="13" name="TextBox 12">
-            <a:extLst>
-              <a:ext uri="{FF2B5EF4-FFF2-40B4-BE49-F238E27FC236}">
-                <a16:creationId xmlns:a16="http://schemas.microsoft.com/office/drawing/2014/main" id="{7F4A6555-E2FC-4FB4-A732-382853A30199}"/>
-              </a:ext>
-            </a:extLst>
-          </p:cNvPr>
-          <p:cNvSpPr txBox="1"/>
-          <p:nvPr/>
-        </p:nvSpPr>
-        <p:spPr>
-          <a:xfrm>
-            <a:off x="6454420" y="820688"/>
-            <a:ext cx="4608576" cy="430887"/>
-          </a:xfrm>
-          <a:prstGeom prst="rect">
-            <a:avLst/>
-          </a:prstGeom>
-          <a:noFill/>
-        </p:spPr>
-        <p:txBody>
-          <a:bodyPr wrap="square" rtlCol="0">
-            <a:spAutoFit/>
-          </a:bodyPr>
-          <a:lstStyle/>
-          <a:p>
-            <a:r>
-              <a:rPr lang="en-US" altLang="ko-KR" sz="2200" b="1" dirty="0"/>
-              <a:t># </a:t>
-            </a:r>
-            <a:r>
-              <a:rPr lang="ko-KR" altLang="en-US" sz="2200" b="1" dirty="0"/>
-              <a:t>개발 기간</a:t>
-            </a:r>
-          </a:p>
-        </p:txBody>
-      </p:sp>
-      <p:sp>
-        <p:nvSpPr>
-          <p:cNvPr id="14" name="TextBox 13">
-            <a:extLst>
-              <a:ext uri="{FF2B5EF4-FFF2-40B4-BE49-F238E27FC236}">
-                <a16:creationId xmlns:a16="http://schemas.microsoft.com/office/drawing/2014/main" id="{D6FBC170-E603-487D-A23C-22125306CA84}"/>
-              </a:ext>
-            </a:extLst>
-          </p:cNvPr>
-          <p:cNvSpPr txBox="1"/>
-          <p:nvPr/>
-        </p:nvSpPr>
-        <p:spPr>
-          <a:xfrm>
-            <a:off x="838200" y="4768237"/>
-            <a:ext cx="4608576" cy="430887"/>
-          </a:xfrm>
-          <a:prstGeom prst="rect">
-            <a:avLst/>
-          </a:prstGeom>
-          <a:noFill/>
-        </p:spPr>
-        <p:txBody>
-          <a:bodyPr wrap="square" rtlCol="0">
-            <a:spAutoFit/>
-          </a:bodyPr>
-          <a:lstStyle/>
-          <a:p>
-            <a:r>
-              <a:rPr lang="en-US" altLang="ko-KR" sz="2200" b="1" dirty="0"/>
-              <a:t># </a:t>
-            </a:r>
-            <a:r>
-              <a:rPr lang="ko-KR" altLang="en-US" sz="2200" b="1" dirty="0"/>
-              <a:t>게임 개요</a:t>
-            </a:r>
-          </a:p>
-        </p:txBody>
-      </p:sp>
-      <p:sp>
-        <p:nvSpPr>
-          <p:cNvPr id="15" name="TextBox 14">
-            <a:extLst>
-              <a:ext uri="{FF2B5EF4-FFF2-40B4-BE49-F238E27FC236}">
-                <a16:creationId xmlns:a16="http://schemas.microsoft.com/office/drawing/2014/main" id="{617BFFA3-6E91-472C-86BE-EE39D4789891}"/>
-              </a:ext>
-            </a:extLst>
-          </p:cNvPr>
-          <p:cNvSpPr txBox="1"/>
-          <p:nvPr/>
-        </p:nvSpPr>
-        <p:spPr>
-          <a:xfrm>
-            <a:off x="6454420" y="2240790"/>
-            <a:ext cx="4608576" cy="430887"/>
-          </a:xfrm>
-          <a:prstGeom prst="rect">
-            <a:avLst/>
-          </a:prstGeom>
-          <a:noFill/>
-        </p:spPr>
-        <p:txBody>
-          <a:bodyPr wrap="square" rtlCol="0">
-            <a:spAutoFit/>
-          </a:bodyPr>
-          <a:lstStyle/>
-          <a:p>
-            <a:r>
-              <a:rPr lang="en-US" altLang="ko-KR" sz="2200" b="1" dirty="0"/>
-              <a:t># </a:t>
-            </a:r>
-            <a:r>
-              <a:rPr lang="ko-KR" altLang="en-US" sz="2200" b="1" dirty="0"/>
-              <a:t>팀원</a:t>
-            </a:r>
-          </a:p>
-        </p:txBody>
-      </p:sp>
-      <p:sp>
-        <p:nvSpPr>
-          <p:cNvPr id="16" name="TextBox 15">
-            <a:extLst>
-              <a:ext uri="{FF2B5EF4-FFF2-40B4-BE49-F238E27FC236}">
-                <a16:creationId xmlns:a16="http://schemas.microsoft.com/office/drawing/2014/main" id="{8E551193-D198-4C9B-B37C-0C4B2891DB21}"/>
-              </a:ext>
-            </a:extLst>
-          </p:cNvPr>
-          <p:cNvSpPr txBox="1"/>
-          <p:nvPr/>
-        </p:nvSpPr>
-        <p:spPr>
-          <a:xfrm>
-            <a:off x="6454420" y="3652668"/>
-            <a:ext cx="4608576" cy="430887"/>
-          </a:xfrm>
-          <a:prstGeom prst="rect">
-            <a:avLst/>
-          </a:prstGeom>
-          <a:noFill/>
-        </p:spPr>
-        <p:txBody>
-          <a:bodyPr wrap="square" rtlCol="0">
-            <a:spAutoFit/>
-          </a:bodyPr>
-          <a:lstStyle/>
-          <a:p>
-            <a:r>
-              <a:rPr lang="en-US" altLang="ko-KR" sz="2200" b="1" dirty="0"/>
-              <a:t># </a:t>
-            </a:r>
-            <a:r>
-              <a:rPr lang="ko-KR" altLang="en-US" sz="2200" b="1" dirty="0"/>
-              <a:t>작업 내용</a:t>
-            </a:r>
-          </a:p>
-        </p:txBody>
-      </p:sp>
-      <p:sp>
-        <p:nvSpPr>
-          <p:cNvPr id="17" name="TextBox 16">
-            <a:extLst>
-              <a:ext uri="{FF2B5EF4-FFF2-40B4-BE49-F238E27FC236}">
-                <a16:creationId xmlns:a16="http://schemas.microsoft.com/office/drawing/2014/main" id="{45E947D1-2453-44DA-BA94-9863FA445F18}"/>
-              </a:ext>
-            </a:extLst>
-          </p:cNvPr>
-          <p:cNvSpPr txBox="1"/>
-          <p:nvPr/>
-        </p:nvSpPr>
-        <p:spPr>
-          <a:xfrm>
-            <a:off x="6454420" y="1249245"/>
-            <a:ext cx="4608576" cy="369332"/>
-          </a:xfrm>
-          <a:prstGeom prst="rect">
-            <a:avLst/>
-          </a:prstGeom>
-          <a:noFill/>
-        </p:spPr>
-        <p:txBody>
-          <a:bodyPr wrap="square" rtlCol="0">
-            <a:spAutoFit/>
-          </a:bodyPr>
-          <a:lstStyle/>
-          <a:p>
-            <a:r>
-              <a:rPr lang="en-US" altLang="ko-KR" b="1" dirty="0"/>
-              <a:t> - 2023.09 ~ 2024.05</a:t>
-            </a:r>
-            <a:endParaRPr lang="ko-KR" altLang="en-US" b="1" dirty="0"/>
-          </a:p>
-        </p:txBody>
-      </p:sp>
-      <p:sp>
-        <p:nvSpPr>
-          <p:cNvPr id="18" name="TextBox 17">
-            <a:extLst>
-              <a:ext uri="{FF2B5EF4-FFF2-40B4-BE49-F238E27FC236}">
-                <a16:creationId xmlns:a16="http://schemas.microsoft.com/office/drawing/2014/main" id="{53F3AF1E-A8AF-44D3-9473-B7E89FEB0964}"/>
-              </a:ext>
-            </a:extLst>
-          </p:cNvPr>
-          <p:cNvSpPr txBox="1"/>
-          <p:nvPr/>
-        </p:nvSpPr>
-        <p:spPr>
-          <a:xfrm>
-            <a:off x="6454420" y="2671677"/>
-            <a:ext cx="4608576" cy="369332"/>
-          </a:xfrm>
-          <a:prstGeom prst="rect">
-            <a:avLst/>
-          </a:prstGeom>
-          <a:noFill/>
-        </p:spPr>
-        <p:txBody>
-          <a:bodyPr wrap="square" rtlCol="0">
-            <a:spAutoFit/>
-          </a:bodyPr>
-          <a:lstStyle/>
-          <a:p>
-            <a:r>
-              <a:rPr lang="en-US" altLang="ko-KR" b="1" dirty="0"/>
-              <a:t> - </a:t>
-            </a:r>
-            <a:r>
-              <a:rPr lang="ko-KR" altLang="en-US" b="1" dirty="0"/>
-              <a:t>개인</a:t>
-            </a:r>
-          </a:p>
-        </p:txBody>
-      </p:sp>
-      <p:sp>
-        <p:nvSpPr>
-          <p:cNvPr id="19" name="TextBox 18">
-            <a:extLst>
-              <a:ext uri="{FF2B5EF4-FFF2-40B4-BE49-F238E27FC236}">
-                <a16:creationId xmlns:a16="http://schemas.microsoft.com/office/drawing/2014/main" id="{9EC2D00E-11F1-4BEC-B4B6-7F1A13722200}"/>
-              </a:ext>
-            </a:extLst>
-          </p:cNvPr>
-          <p:cNvSpPr txBox="1"/>
-          <p:nvPr/>
-        </p:nvSpPr>
-        <p:spPr>
-          <a:xfrm>
-            <a:off x="6454420" y="4083555"/>
-            <a:ext cx="4608576" cy="369332"/>
-          </a:xfrm>
-          <a:prstGeom prst="rect">
-            <a:avLst/>
-          </a:prstGeom>
-          <a:noFill/>
-        </p:spPr>
-        <p:txBody>
-          <a:bodyPr wrap="square" rtlCol="0">
-            <a:spAutoFit/>
-          </a:bodyPr>
-          <a:lstStyle/>
-          <a:p>
-            <a:r>
-              <a:rPr lang="en-US" altLang="ko-KR" b="1" dirty="0"/>
-              <a:t> - </a:t>
-            </a:r>
-            <a:endParaRPr lang="ko-KR" altLang="en-US" b="1" dirty="0"/>
-          </a:p>
-        </p:txBody>
-      </p:sp>
-      <p:sp>
-        <p:nvSpPr>
-          <p:cNvPr id="20" name="TextBox 19">
-            <a:extLst>
-              <a:ext uri="{FF2B5EF4-FFF2-40B4-BE49-F238E27FC236}">
-                <a16:creationId xmlns:a16="http://schemas.microsoft.com/office/drawing/2014/main" id="{EE47C559-C9D0-4176-B40C-15AA0A8363E5}"/>
-              </a:ext>
-            </a:extLst>
-          </p:cNvPr>
-          <p:cNvSpPr txBox="1"/>
-          <p:nvPr/>
-        </p:nvSpPr>
-        <p:spPr>
-          <a:xfrm>
-            <a:off x="838200" y="5199124"/>
-            <a:ext cx="4608576" cy="369332"/>
-          </a:xfrm>
-          <a:prstGeom prst="rect">
-            <a:avLst/>
-          </a:prstGeom>
-          <a:noFill/>
-        </p:spPr>
-        <p:txBody>
-          <a:bodyPr wrap="square" rtlCol="0">
-            <a:spAutoFit/>
-          </a:bodyPr>
-          <a:lstStyle/>
-          <a:p>
-            <a:r>
-              <a:rPr lang="en-US" altLang="ko-KR" b="1" dirty="0"/>
-              <a:t> - </a:t>
-            </a:r>
-            <a:endParaRPr lang="ko-KR" altLang="en-US" b="1" dirty="0"/>
-          </a:p>
-        </p:txBody>
-      </p:sp>
-    </p:spTree>
-    <p:extLst>
-      <p:ext uri="{BB962C8B-B14F-4D97-AF65-F5344CB8AC3E}">
-        <p14:creationId xmlns:p14="http://schemas.microsoft.com/office/powerpoint/2010/main" val="1291740744"/>
-      </p:ext>
-    </p:extLst>
-  </p:cSld>
-  <p:clrMapOvr>
-    <a:masterClrMapping/>
-  </p:clrMapOvr>
-</p:sld>
-</file>
-
-<file path=ppt/slides/slide16.xml><?xml version="1.0" encoding="utf-8"?>
-<p:sld xmlns:a="http://schemas.openxmlformats.org/drawingml/2006/main" xmlns:r="http://schemas.openxmlformats.org/officeDocument/2006/relationships" xmlns:p="http://schemas.openxmlformats.org/presentationml/2006/main">
-  <p:cSld>
-    <p:spTree>
-      <p:nvGrpSpPr>
-        <p:cNvPr id="1" name=""/>
-        <p:cNvGrpSpPr/>
-        <p:nvPr/>
-      </p:nvGrpSpPr>
-      <p:grpSpPr>
-        <a:xfrm>
-          <a:off x="0" y="0"/>
-          <a:ext cx="0" cy="0"/>
-          <a:chOff x="0" y="0"/>
-          <a:chExt cx="0" cy="0"/>
-        </a:xfrm>
-      </p:grpSpPr>
-      <p:sp>
-        <p:nvSpPr>
-          <p:cNvPr id="2" name="제목 1">
-            <a:extLst>
-              <a:ext uri="{FF2B5EF4-FFF2-40B4-BE49-F238E27FC236}">
-                <a16:creationId xmlns:a16="http://schemas.microsoft.com/office/drawing/2014/main" id="{6FF7DBDA-DB81-406A-A742-93DF6F6D8BFF}"/>
-              </a:ext>
-            </a:extLst>
-          </p:cNvPr>
-          <p:cNvSpPr>
-            <a:spLocks noGrp="1"/>
-          </p:cNvSpPr>
-          <p:nvPr>
-            <p:ph type="title"/>
-          </p:nvPr>
-        </p:nvSpPr>
-        <p:spPr/>
-        <p:txBody>
-          <a:bodyPr/>
-          <a:lstStyle/>
-          <a:p>
-            <a:r>
-              <a:rPr lang="en-US" altLang="ko-KR" b="1" dirty="0"/>
               <a:t>- </a:t>
             </a:r>
             <a:r>
@@ -5626,7 +4534,7 @@
 </p:sld>
 </file>
 
-<file path=ppt/slides/slide17.xml><?xml version="1.0" encoding="utf-8"?>
+<file path=ppt/slides/slide14.xml><?xml version="1.0" encoding="utf-8"?>
 <p:sld xmlns:a="http://schemas.openxmlformats.org/drawingml/2006/main" xmlns:r="http://schemas.openxmlformats.org/officeDocument/2006/relationships" xmlns:p="http://schemas.openxmlformats.org/presentationml/2006/main">
   <p:cSld>
     <p:spTree>
@@ -6926,7 +5834,7 @@
         </p:nvSpPr>
         <p:spPr>
           <a:xfrm>
-            <a:off x="6454420" y="2240790"/>
+            <a:off x="6454420" y="3213556"/>
             <a:ext cx="4608576" cy="430887"/>
           </a:xfrm>
           <a:prstGeom prst="rect">
@@ -6965,7 +5873,7 @@
         </p:nvSpPr>
         <p:spPr>
           <a:xfrm>
-            <a:off x="6454420" y="3652668"/>
+            <a:off x="6454420" y="4444662"/>
             <a:ext cx="4608576" cy="430887"/>
           </a:xfrm>
           <a:prstGeom prst="rect">
@@ -7040,7 +5948,7 @@
         </p:nvSpPr>
         <p:spPr>
           <a:xfrm>
-            <a:off x="6454420" y="2671677"/>
+            <a:off x="6454420" y="3644443"/>
             <a:ext cx="4608576" cy="369332"/>
           </a:xfrm>
           <a:prstGeom prst="rect">
@@ -7060,26 +5968,47 @@
             </a:r>
             <a:r>
               <a:rPr lang="ko-KR" altLang="en-US" b="1" dirty="0"/>
-              <a:t>개인</a:t>
-            </a:r>
-          </a:p>
-        </p:txBody>
-      </p:sp>
-      <p:sp>
-        <p:nvSpPr>
-          <p:cNvPr id="13" name="TextBox 12">
-            <a:extLst>
-              <a:ext uri="{FF2B5EF4-FFF2-40B4-BE49-F238E27FC236}">
-                <a16:creationId xmlns:a16="http://schemas.microsoft.com/office/drawing/2014/main" id="{71EF4413-F48C-4266-8B71-F59AA0F08088}"/>
-              </a:ext>
-            </a:extLst>
-          </p:cNvPr>
-          <p:cNvSpPr txBox="1"/>
-          <p:nvPr/>
-        </p:nvSpPr>
-        <p:spPr>
-          <a:xfrm>
-            <a:off x="6454420" y="4083555"/>
+              <a:t>기획 </a:t>
+            </a:r>
+            <a:r>
+              <a:rPr lang="en-US" altLang="ko-KR" b="1" dirty="0"/>
+              <a:t>2, </a:t>
+            </a:r>
+            <a:r>
+              <a:rPr lang="ko-KR" altLang="en-US" b="1" dirty="0"/>
+              <a:t>소프트 </a:t>
+            </a:r>
+            <a:r>
+              <a:rPr lang="en-US" altLang="ko-KR" b="1" dirty="0"/>
+              <a:t>5, </a:t>
+            </a:r>
+            <a:r>
+              <a:rPr lang="ko-KR" altLang="en-US" b="1" dirty="0"/>
+              <a:t>그래픽 </a:t>
+            </a:r>
+            <a:r>
+              <a:rPr lang="en-US" altLang="ko-KR" b="1" dirty="0"/>
+              <a:t>6</a:t>
+            </a:r>
+            <a:endParaRPr lang="ko-KR" altLang="en-US" b="1" dirty="0"/>
+          </a:p>
+        </p:txBody>
+      </p:sp>
+      <p:sp>
+        <p:nvSpPr>
+          <p:cNvPr id="14" name="TextBox 13">
+            <a:extLst>
+              <a:ext uri="{FF2B5EF4-FFF2-40B4-BE49-F238E27FC236}">
+                <a16:creationId xmlns:a16="http://schemas.microsoft.com/office/drawing/2014/main" id="{96AB9D6D-0683-4B12-AA6A-EADD6C6BEEE5}"/>
+              </a:ext>
+            </a:extLst>
+          </p:cNvPr>
+          <p:cNvSpPr txBox="1"/>
+          <p:nvPr/>
+        </p:nvSpPr>
+        <p:spPr>
+          <a:xfrm>
+            <a:off x="838200" y="5199124"/>
             <a:ext cx="4608576" cy="369332"/>
           </a:xfrm>
           <a:prstGeom prst="rect">
@@ -7103,19 +6032,94 @@
       </p:sp>
       <p:sp>
         <p:nvSpPr>
-          <p:cNvPr id="14" name="TextBox 13">
-            <a:extLst>
-              <a:ext uri="{FF2B5EF4-FFF2-40B4-BE49-F238E27FC236}">
-                <a16:creationId xmlns:a16="http://schemas.microsoft.com/office/drawing/2014/main" id="{96AB9D6D-0683-4B12-AA6A-EADD6C6BEEE5}"/>
-              </a:ext>
-            </a:extLst>
-          </p:cNvPr>
-          <p:cNvSpPr txBox="1"/>
-          <p:nvPr/>
-        </p:nvSpPr>
-        <p:spPr>
-          <a:xfrm>
-            <a:off x="838200" y="5199124"/>
+          <p:cNvPr id="15" name="TextBox 14">
+            <a:extLst>
+              <a:ext uri="{FF2B5EF4-FFF2-40B4-BE49-F238E27FC236}">
+                <a16:creationId xmlns:a16="http://schemas.microsoft.com/office/drawing/2014/main" id="{99BC87C4-77AC-4520-A57B-790393F88DF4}"/>
+              </a:ext>
+            </a:extLst>
+          </p:cNvPr>
+          <p:cNvSpPr txBox="1"/>
+          <p:nvPr/>
+        </p:nvSpPr>
+        <p:spPr>
+          <a:xfrm>
+            <a:off x="6454420" y="2037449"/>
+            <a:ext cx="4608576" cy="430887"/>
+          </a:xfrm>
+          <a:prstGeom prst="rect">
+            <a:avLst/>
+          </a:prstGeom>
+          <a:noFill/>
+        </p:spPr>
+        <p:txBody>
+          <a:bodyPr wrap="square" rtlCol="0">
+            <a:spAutoFit/>
+          </a:bodyPr>
+          <a:lstStyle/>
+          <a:p>
+            <a:r>
+              <a:rPr lang="en-US" altLang="ko-KR" sz="2200" b="1" dirty="0"/>
+              <a:t># </a:t>
+            </a:r>
+            <a:r>
+              <a:rPr lang="ko-KR" altLang="en-US" sz="2200" b="1" dirty="0"/>
+              <a:t>참여 기간</a:t>
+            </a:r>
+          </a:p>
+        </p:txBody>
+      </p:sp>
+      <p:sp>
+        <p:nvSpPr>
+          <p:cNvPr id="16" name="TextBox 15">
+            <a:extLst>
+              <a:ext uri="{FF2B5EF4-FFF2-40B4-BE49-F238E27FC236}">
+                <a16:creationId xmlns:a16="http://schemas.microsoft.com/office/drawing/2014/main" id="{32E4FD2D-E2ED-4918-B56A-DC054D8B4A98}"/>
+              </a:ext>
+            </a:extLst>
+          </p:cNvPr>
+          <p:cNvSpPr txBox="1"/>
+          <p:nvPr/>
+        </p:nvSpPr>
+        <p:spPr>
+          <a:xfrm>
+            <a:off x="6454420" y="2466006"/>
+            <a:ext cx="4608576" cy="369332"/>
+          </a:xfrm>
+          <a:prstGeom prst="rect">
+            <a:avLst/>
+          </a:prstGeom>
+          <a:noFill/>
+        </p:spPr>
+        <p:txBody>
+          <a:bodyPr wrap="square" rtlCol="0">
+            <a:spAutoFit/>
+          </a:bodyPr>
+          <a:lstStyle/>
+          <a:p>
+            <a:r>
+              <a:rPr lang="en-US" altLang="ko-KR" b="1" dirty="0"/>
+              <a:t> - 2023.01 ~ 2023.09</a:t>
+            </a:r>
+            <a:endParaRPr lang="ko-KR" altLang="en-US" b="1" dirty="0"/>
+          </a:p>
+        </p:txBody>
+      </p:sp>
+      <p:sp>
+        <p:nvSpPr>
+          <p:cNvPr id="17" name="TextBox 16">
+            <a:extLst>
+              <a:ext uri="{FF2B5EF4-FFF2-40B4-BE49-F238E27FC236}">
+                <a16:creationId xmlns:a16="http://schemas.microsoft.com/office/drawing/2014/main" id="{DD585B1B-5F70-40E9-B91A-181B103BE704}"/>
+              </a:ext>
+            </a:extLst>
+          </p:cNvPr>
+          <p:cNvSpPr txBox="1"/>
+          <p:nvPr/>
+        </p:nvSpPr>
+        <p:spPr>
+          <a:xfrm>
+            <a:off x="6454420" y="4875549"/>
             <a:ext cx="4608576" cy="369332"/>
           </a:xfrm>
           <a:prstGeom prst="rect">
@@ -7430,8 +6434,37 @@
             </a:r>
             <a:r>
               <a:rPr lang="ko-KR" altLang="en-US" b="1" dirty="0"/>
-              <a:t>개인</a:t>
-            </a:r>
+              <a:t>클라이언트 </a:t>
+            </a:r>
+            <a:r>
+              <a:rPr lang="en-US" altLang="ko-KR" b="1" dirty="0"/>
+              <a:t>1, </a:t>
+            </a:r>
+            <a:r>
+              <a:rPr lang="ko-KR" altLang="en-US" b="1" dirty="0"/>
+              <a:t>서버 </a:t>
+            </a:r>
+            <a:r>
+              <a:rPr lang="en-US" altLang="ko-KR" b="1" dirty="0"/>
+              <a:t>1, </a:t>
+            </a:r>
+            <a:r>
+              <a:rPr lang="ko-KR" altLang="en-US" b="1" dirty="0"/>
+              <a:t>기획 </a:t>
+            </a:r>
+            <a:r>
+              <a:rPr lang="en-US" altLang="ko-KR" b="1" dirty="0"/>
+              <a:t>2, </a:t>
+            </a:r>
+            <a:r>
+              <a:rPr lang="ko-KR" altLang="en-US" b="1" dirty="0"/>
+              <a:t>이펙트 </a:t>
+            </a:r>
+            <a:r>
+              <a:rPr lang="en-US" altLang="ko-KR" b="1" dirty="0"/>
+              <a:t>1, UI 1</a:t>
+            </a:r>
+            <a:endParaRPr lang="ko-KR" altLang="en-US" b="1" dirty="0"/>
           </a:p>
         </p:txBody>
       </p:sp>
@@ -8482,7 +7515,7 @@
           <a:p>
             <a:r>
               <a:rPr lang="en-US" altLang="ko-KR" b="1" dirty="0"/>
-              <a:t> - 2023.09 ~ 2024.05</a:t>
+              <a:t> - 2023.09 ~ 2023.12</a:t>
             </a:r>
             <a:endParaRPr lang="ko-KR" altLang="en-US" b="1" dirty="0"/>
           </a:p>
@@ -8847,7 +7880,7 @@
           <a:p>
             <a:r>
               <a:rPr lang="en-US" altLang="ko-KR" b="1" dirty="0"/>
-              <a:t> - 2023.09 ~ 2024.05</a:t>
+              <a:t> - 2023.03 ~ 2023.06</a:t>
             </a:r>
             <a:endParaRPr lang="ko-KR" altLang="en-US" b="1" dirty="0"/>
           </a:p>

</xml_diff>